<commit_message>
clear unused codes and fix redpoint disappeared and leftmenu scrool bug.
</commit_message>
<xml_diff>
--- a/detail.pptx
+++ b/detail.pptx
@@ -129,6 +129,61 @@
 </p:presentation>
 </file>
 
+<file path=ppt/commentAuthors.xml><?xml version="1.0" encoding="utf-8"?>
+<p:cmAuthorLst xmlns:a="http://schemas.openxmlformats.org/drawingml/2006/main" xmlns:r="http://schemas.openxmlformats.org/officeDocument/2006/relationships" xmlns:p="http://schemas.openxmlformats.org/presentationml/2006/main">
+  <p:cmAuthor id="1" name="alfred" initials="a" lastIdx="2" clrIdx="0">
+    <p:extLst>
+      <p:ext uri="{19B8F6BF-5375-455C-9EA6-DF929625EA0E}">
+        <p15:presenceInfo xmlns:p15="http://schemas.microsoft.com/office/powerpoint/2012/main" userId="alfred" providerId="None"/>
+      </p:ext>
+    </p:extLst>
+  </p:cmAuthor>
+</p:cmAuthorLst>
+</file>
+
+<file path=ppt/comments/comment1.xml><?xml version="1.0" encoding="utf-8"?>
+<p:cmLst xmlns:a="http://schemas.openxmlformats.org/drawingml/2006/main" xmlns:r="http://schemas.openxmlformats.org/officeDocument/2006/relationships" xmlns:p="http://schemas.openxmlformats.org/presentationml/2006/main">
+  <p:cm authorId="1" dt="2019-11-23T15:14:40.641" idx="1">
+    <p:pos x="4752" y="2236"/>
+    <p:text>RelativeLayout imageView =(RelativeLayout)findViewById(R.id.rl_flash);
+        RotateAnimation rotateAnimation=new RotateAnimation(0,360,RotateAnimation.RELATIVE_TO_SELF ,0.5f,RotateAnimation.RELATIVE_TO_SELF,0.5f);
+        rotateAnimation.setFillAfter(true);
+        AlphaAnimation alphaAnimation=new AlphaAnimation(0,1f);
+        alphaAnimation.setFillAfter(true);
+        ScaleAnimation scaleAnimation=new ScaleAnimation(0,1,0,1,ScaleAnimation.RELATIVE_TO_SELF,0.5f,ScaleAnimation.RELATIVE_TO_SELF,0.5f);
+        scaleAnimation.setFillAfter(true);
+        AnimationSet set = new AnimationSet(false);
+        set.addAnimation(alphaAnimation);
+        set.addAnimation(rotateAnimation);
+        set.addAnimation(scaleAnimation);
+        set.setDuration(2000);
+        imageView.startAnimation(set);
+        set.setAnimationListener(new MyAnimationListener());</p:text>
+    <p:extLst>
+      <p:ext uri="{C676402C-5697-4E1C-873F-D02D1690AC5C}">
+        <p15:threadingInfo xmlns:p15="http://schemas.microsoft.com/office/powerpoint/2012/main" timeZoneBias="-480"/>
+      </p:ext>
+    </p:extLst>
+  </p:cm>
+  <p:cm authorId="1" dt="2019-11-23T15:15:28.870" idx="2">
+    <p:pos x="2505" y="237"/>
+    <p:text>SharedPreferences sp = context.getSharedPreferences(PACKAGE_FLASH, Context.MODE_PRIVATE);
+        if (value == null) {
+            boolean result = sp.getBoolean(FLAG_FLASH, false);
+            MyLog.Df("Config.hadFlash: %s", result);
+            return result;
+        }
+        MyLog.Df("Config.hadFlash: %s", value);
+        sp.edit().putBoolean(FLAG_FLASH, value).commit();</p:text>
+    <p:extLst>
+      <p:ext uri="{C676402C-5697-4E1C-873F-D02D1690AC5C}">
+        <p15:threadingInfo xmlns:p15="http://schemas.microsoft.com/office/powerpoint/2012/main" timeZoneBias="-480"/>
+      </p:ext>
+    </p:extLst>
+  </p:cm>
+</p:cmLst>
+</file>
+
 <file path=ppt/slideLayouts/slideLayout1.xml><?xml version="1.0" encoding="utf-8"?>
 <p:sldLayout xmlns:a="http://schemas.openxmlformats.org/drawingml/2006/main" xmlns:r="http://schemas.openxmlformats.org/officeDocument/2006/relationships" xmlns:p="http://schemas.openxmlformats.org/presentationml/2006/main" type="title" preserve="1">
   <p:cSld name="标题幻灯片">
@@ -260,7 +315,7 @@
           <a:p>
             <a:fld id="{F8C606AD-1BAA-4248-A1C2-4F9D3BB2077A}" type="datetimeFigureOut">
               <a:rPr lang="zh-CN" altLang="en-US" smtClean="0"/>
-              <a:t>2019/11/23</a:t>
+              <a:t>2019/11/24</a:t>
             </a:fld>
             <a:endParaRPr lang="zh-CN" altLang="en-US"/>
           </a:p>
@@ -430,7 +485,7 @@
           <a:p>
             <a:fld id="{F8C606AD-1BAA-4248-A1C2-4F9D3BB2077A}" type="datetimeFigureOut">
               <a:rPr lang="zh-CN" altLang="en-US" smtClean="0"/>
-              <a:t>2019/11/23</a:t>
+              <a:t>2019/11/24</a:t>
             </a:fld>
             <a:endParaRPr lang="zh-CN" altLang="en-US"/>
           </a:p>
@@ -610,7 +665,7 @@
           <a:p>
             <a:fld id="{F8C606AD-1BAA-4248-A1C2-4F9D3BB2077A}" type="datetimeFigureOut">
               <a:rPr lang="zh-CN" altLang="en-US" smtClean="0"/>
-              <a:t>2019/11/23</a:t>
+              <a:t>2019/11/24</a:t>
             </a:fld>
             <a:endParaRPr lang="zh-CN" altLang="en-US"/>
           </a:p>
@@ -780,7 +835,7 @@
           <a:p>
             <a:fld id="{F8C606AD-1BAA-4248-A1C2-4F9D3BB2077A}" type="datetimeFigureOut">
               <a:rPr lang="zh-CN" altLang="en-US" smtClean="0"/>
-              <a:t>2019/11/23</a:t>
+              <a:t>2019/11/24</a:t>
             </a:fld>
             <a:endParaRPr lang="zh-CN" altLang="en-US"/>
           </a:p>
@@ -1026,7 +1081,7 @@
           <a:p>
             <a:fld id="{F8C606AD-1BAA-4248-A1C2-4F9D3BB2077A}" type="datetimeFigureOut">
               <a:rPr lang="zh-CN" altLang="en-US" smtClean="0"/>
-              <a:t>2019/11/23</a:t>
+              <a:t>2019/11/24</a:t>
             </a:fld>
             <a:endParaRPr lang="zh-CN" altLang="en-US"/>
           </a:p>
@@ -1258,7 +1313,7 @@
           <a:p>
             <a:fld id="{F8C606AD-1BAA-4248-A1C2-4F9D3BB2077A}" type="datetimeFigureOut">
               <a:rPr lang="zh-CN" altLang="en-US" smtClean="0"/>
-              <a:t>2019/11/23</a:t>
+              <a:t>2019/11/24</a:t>
             </a:fld>
             <a:endParaRPr lang="zh-CN" altLang="en-US"/>
           </a:p>
@@ -1625,7 +1680,7 @@
           <a:p>
             <a:fld id="{F8C606AD-1BAA-4248-A1C2-4F9D3BB2077A}" type="datetimeFigureOut">
               <a:rPr lang="zh-CN" altLang="en-US" smtClean="0"/>
-              <a:t>2019/11/23</a:t>
+              <a:t>2019/11/24</a:t>
             </a:fld>
             <a:endParaRPr lang="zh-CN" altLang="en-US"/>
           </a:p>
@@ -1743,7 +1798,7 @@
           <a:p>
             <a:fld id="{F8C606AD-1BAA-4248-A1C2-4F9D3BB2077A}" type="datetimeFigureOut">
               <a:rPr lang="zh-CN" altLang="en-US" smtClean="0"/>
-              <a:t>2019/11/23</a:t>
+              <a:t>2019/11/24</a:t>
             </a:fld>
             <a:endParaRPr lang="zh-CN" altLang="en-US"/>
           </a:p>
@@ -1838,7 +1893,7 @@
           <a:p>
             <a:fld id="{F8C606AD-1BAA-4248-A1C2-4F9D3BB2077A}" type="datetimeFigureOut">
               <a:rPr lang="zh-CN" altLang="en-US" smtClean="0"/>
-              <a:t>2019/11/23</a:t>
+              <a:t>2019/11/24</a:t>
             </a:fld>
             <a:endParaRPr lang="zh-CN" altLang="en-US"/>
           </a:p>
@@ -2115,7 +2170,7 @@
           <a:p>
             <a:fld id="{F8C606AD-1BAA-4248-A1C2-4F9D3BB2077A}" type="datetimeFigureOut">
               <a:rPr lang="zh-CN" altLang="en-US" smtClean="0"/>
-              <a:t>2019/11/23</a:t>
+              <a:t>2019/11/24</a:t>
             </a:fld>
             <a:endParaRPr lang="zh-CN" altLang="en-US"/>
           </a:p>
@@ -2368,7 +2423,7 @@
           <a:p>
             <a:fld id="{F8C606AD-1BAA-4248-A1C2-4F9D3BB2077A}" type="datetimeFigureOut">
               <a:rPr lang="zh-CN" altLang="en-US" smtClean="0"/>
-              <a:t>2019/11/23</a:t>
+              <a:t>2019/11/24</a:t>
             </a:fld>
             <a:endParaRPr lang="zh-CN" altLang="en-US"/>
           </a:p>
@@ -2581,7 +2636,7 @@
           <a:p>
             <a:fld id="{F8C606AD-1BAA-4248-A1C2-4F9D3BB2077A}" type="datetimeFigureOut">
               <a:rPr lang="zh-CN" altLang="en-US" smtClean="0"/>
-              <a:t>2019/11/23</a:t>
+              <a:t>2019/11/24</a:t>
             </a:fld>
             <a:endParaRPr lang="zh-CN" altLang="en-US"/>
           </a:p>
@@ -3059,7 +3114,7 @@
           <a:lstStyle/>
           <a:p>
             <a:pPr algn="ctr"/>
-            <a:endParaRPr lang="zh-CN" altLang="en-US"/>
+            <a:endParaRPr lang="zh-CN" altLang="en-US" dirty="0"/>
           </a:p>
         </p:txBody>
       </p:sp>
@@ -3102,7 +3157,7 @@
         <p:spPr>
           <a:xfrm>
             <a:off x="7393858" y="2408903"/>
-            <a:ext cx="3642852" cy="1200329"/>
+            <a:ext cx="3642852" cy="1477328"/>
           </a:xfrm>
           <a:prstGeom prst="rect">
             <a:avLst/>
@@ -3125,13 +3180,431 @@
             </a:r>
             <a:r>
               <a:rPr lang="zh-CN" altLang="en-US" dirty="0" smtClean="0"/>
-              <a:t>旋转，从小到大三个动面组合</a:t>
-            </a:r>
-            <a:r>
-              <a:rPr lang="zh-CN" altLang="en-US" dirty="0" smtClean="0"/>
-              <a:t>完成，动画完成后会跳转广告画面</a:t>
-            </a:r>
+              <a:t>旋转，从小到大三个动面组合完成，动画完成后会跳转广告画面</a:t>
+            </a:r>
+            <a:endParaRPr lang="en-US" altLang="zh-CN" dirty="0" smtClean="0"/>
+          </a:p>
+          <a:p>
             <a:endParaRPr lang="zh-CN" altLang="en-US" dirty="0"/>
+          </a:p>
+        </p:txBody>
+      </p:sp>
+      <p:sp>
+        <p:nvSpPr>
+          <p:cNvPr id="3" name="文本框 2"/>
+          <p:cNvSpPr txBox="1"/>
+          <p:nvPr/>
+        </p:nvSpPr>
+        <p:spPr>
+          <a:xfrm>
+            <a:off x="3634831" y="5860928"/>
+            <a:ext cx="2228295" cy="369332"/>
+          </a:xfrm>
+          <a:prstGeom prst="rect">
+            <a:avLst/>
+          </a:prstGeom>
+          <a:noFill/>
+        </p:spPr>
+        <p:txBody>
+          <a:bodyPr wrap="square" rtlCol="0">
+            <a:spAutoFit/>
+          </a:bodyPr>
+          <a:lstStyle/>
+          <a:p>
+            <a:r>
+              <a:rPr lang="en-US" altLang="zh-CN" dirty="0" smtClean="0"/>
+              <a:t>activity_flash.xml </a:t>
+            </a:r>
+            <a:endParaRPr lang="zh-CN" altLang="en-US" dirty="0"/>
+          </a:p>
+        </p:txBody>
+      </p:sp>
+      <p:sp>
+        <p:nvSpPr>
+          <p:cNvPr id="4" name="Rectangle 2"/>
+          <p:cNvSpPr>
+            <a:spLocks noChangeArrowheads="1"/>
+          </p:cNvSpPr>
+          <p:nvPr/>
+        </p:nvSpPr>
+        <p:spPr bwMode="auto">
+          <a:xfrm>
+            <a:off x="5723375" y="5884779"/>
+            <a:ext cx="1991319" cy="276999"/>
+          </a:xfrm>
+          <a:prstGeom prst="rect">
+            <a:avLst/>
+          </a:prstGeom>
+          <a:solidFill>
+            <a:srgbClr val="FFFFFF"/>
+          </a:solidFill>
+          <a:ln>
+            <a:noFill/>
+          </a:ln>
+          <a:effectLst/>
+          <a:extLst>
+            <a:ext uri="{91240B29-F687-4F45-9708-019B960494DF}">
+              <a14:hiddenLine xmlns:a14="http://schemas.microsoft.com/office/drawing/2010/main" w="9525">
+                <a:solidFill>
+                  <a:schemeClr val="tx1"/>
+                </a:solidFill>
+                <a:miter lim="800000"/>
+                <a:headEnd/>
+                <a:tailEnd/>
+              </a14:hiddenLine>
+            </a:ext>
+            <a:ext uri="{AF507438-7753-43E0-B8FC-AC1667EBCBE1}">
+              <a14:hiddenEffects xmlns:a14="http://schemas.microsoft.com/office/drawing/2010/main">
+                <a:effectLst>
+                  <a:outerShdw dist="35921" dir="2700000" algn="ctr" rotWithShape="0">
+                    <a:schemeClr val="bg2"/>
+                  </a:outerShdw>
+                </a:effectLst>
+              </a14:hiddenEffects>
+            </a:ext>
+          </a:extLst>
+        </p:spPr>
+        <p:txBody>
+          <a:bodyPr vert="horz" wrap="square" lIns="91440" tIns="45720" rIns="91440" bIns="45720" numCol="1" anchor="ctr" anchorCtr="0" compatLnSpc="1">
+            <a:prstTxWarp prst="textNoShape">
+              <a:avLst/>
+            </a:prstTxWarp>
+            <a:spAutoFit/>
+          </a:bodyPr>
+          <a:lstStyle/>
+          <a:p>
+            <a:pPr marL="0" marR="0" lvl="0" indent="0" algn="l" defTabSz="914400" rtl="0" eaLnBrk="0" fontAlgn="base" latinLnBrk="0" hangingPunct="0">
+              <a:lnSpc>
+                <a:spcPct val="100000"/>
+              </a:lnSpc>
+              <a:spcBef>
+                <a:spcPct val="0"/>
+              </a:spcBef>
+              <a:spcAft>
+                <a:spcPct val="0"/>
+              </a:spcAft>
+              <a:buClrTx/>
+              <a:buSzTx/>
+              <a:buFontTx/>
+              <a:buNone/>
+              <a:tabLst/>
+            </a:pPr>
+            <a:r>
+              <a:rPr kumimoji="0" lang="zh-CN" altLang="zh-CN" sz="1200" b="1" i="0" u="none" strike="noStrike" cap="none" normalizeH="0" baseline="0" dirty="0" smtClean="0">
+                <a:ln>
+                  <a:noFill/>
+                </a:ln>
+                <a:solidFill>
+                  <a:srgbClr val="008000"/>
+                </a:solidFill>
+                <a:effectLst/>
+                <a:latin typeface="宋体" panose="02010600030101010101" pitchFamily="2" charset="-122"/>
+                <a:ea typeface="宋体" panose="02010600030101010101" pitchFamily="2" charset="-122"/>
+              </a:rPr>
+              <a:t>ui.FlashActivity</a:t>
+            </a:r>
+            <a:r>
+              <a:rPr kumimoji="0" lang="en-US" altLang="zh-CN" sz="1200" b="1" i="0" u="none" strike="noStrike" cap="none" normalizeH="0" baseline="0" dirty="0" smtClean="0">
+                <a:ln>
+                  <a:noFill/>
+                </a:ln>
+                <a:solidFill>
+                  <a:srgbClr val="008000"/>
+                </a:solidFill>
+                <a:effectLst/>
+                <a:latin typeface="宋体" panose="02010600030101010101" pitchFamily="2" charset="-122"/>
+                <a:ea typeface="宋体" panose="02010600030101010101" pitchFamily="2" charset="-122"/>
+              </a:rPr>
+              <a:t>.java</a:t>
+            </a:r>
+            <a:endParaRPr kumimoji="0" lang="zh-CN" altLang="zh-CN" sz="1200" b="0" i="0" u="none" strike="noStrike" cap="none" normalizeH="0" baseline="0" dirty="0" smtClean="0">
+              <a:ln>
+                <a:noFill/>
+              </a:ln>
+              <a:solidFill>
+                <a:schemeClr val="tx1"/>
+              </a:solidFill>
+              <a:effectLst/>
+              <a:latin typeface="Arial" panose="020B0604020202020204" pitchFamily="34" charset="0"/>
+            </a:endParaRPr>
+          </a:p>
+        </p:txBody>
+      </p:sp>
+      <p:sp>
+        <p:nvSpPr>
+          <p:cNvPr id="6" name="Rectangle 1"/>
+          <p:cNvSpPr>
+            <a:spLocks noChangeArrowheads="1"/>
+          </p:cNvSpPr>
+          <p:nvPr/>
+        </p:nvSpPr>
+        <p:spPr bwMode="auto">
+          <a:xfrm>
+            <a:off x="6813550" y="4183534"/>
+            <a:ext cx="5035550" cy="230832"/>
+          </a:xfrm>
+          <a:prstGeom prst="rect">
+            <a:avLst/>
+          </a:prstGeom>
+          <a:solidFill>
+            <a:srgbClr val="FFFFFF"/>
+          </a:solidFill>
+          <a:ln>
+            <a:noFill/>
+          </a:ln>
+          <a:effectLst/>
+          <a:extLst>
+            <a:ext uri="{91240B29-F687-4F45-9708-019B960494DF}">
+              <a14:hiddenLine xmlns:a14="http://schemas.microsoft.com/office/drawing/2010/main" w="9525">
+                <a:solidFill>
+                  <a:schemeClr val="tx1"/>
+                </a:solidFill>
+                <a:miter lim="800000"/>
+                <a:headEnd/>
+                <a:tailEnd/>
+              </a14:hiddenLine>
+            </a:ext>
+            <a:ext uri="{AF507438-7753-43E0-B8FC-AC1667EBCBE1}">
+              <a14:hiddenEffects xmlns:a14="http://schemas.microsoft.com/office/drawing/2010/main">
+                <a:effectLst>
+                  <a:outerShdw dist="35921" dir="2700000" algn="ctr" rotWithShape="0">
+                    <a:schemeClr val="bg2"/>
+                  </a:outerShdw>
+                </a:effectLst>
+              </a14:hiddenEffects>
+            </a:ext>
+          </a:extLst>
+        </p:spPr>
+        <p:txBody>
+          <a:bodyPr vert="horz" wrap="square" lIns="91440" tIns="45720" rIns="91440" bIns="45720" numCol="1" anchor="ctr" anchorCtr="0" compatLnSpc="1">
+            <a:prstTxWarp prst="textNoShape">
+              <a:avLst/>
+            </a:prstTxWarp>
+            <a:spAutoFit/>
+          </a:bodyPr>
+          <a:lstStyle/>
+          <a:p>
+            <a:pPr marL="0" marR="0" lvl="0" indent="0" algn="l" defTabSz="914400" rtl="0" eaLnBrk="0" fontAlgn="base" latinLnBrk="0" hangingPunct="0">
+              <a:lnSpc>
+                <a:spcPct val="100000"/>
+              </a:lnSpc>
+              <a:spcBef>
+                <a:spcPct val="0"/>
+              </a:spcBef>
+              <a:spcAft>
+                <a:spcPct val="0"/>
+              </a:spcAft>
+              <a:buClrTx/>
+              <a:buSzTx/>
+              <a:buFontTx/>
+              <a:buNone/>
+              <a:tabLst/>
+            </a:pPr>
+            <a:r>
+              <a:rPr kumimoji="0" lang="zh-CN" altLang="zh-CN" sz="900" b="0" i="0" u="none" strike="noStrike" cap="none" normalizeH="0" baseline="0" dirty="0" smtClean="0">
+                <a:ln>
+                  <a:noFill/>
+                </a:ln>
+                <a:solidFill>
+                  <a:srgbClr val="000000"/>
+                </a:solidFill>
+                <a:effectLst/>
+                <a:latin typeface="宋体" panose="02010600030101010101" pitchFamily="2" charset="-122"/>
+                <a:ea typeface="宋体" panose="02010600030101010101" pitchFamily="2" charset="-122"/>
+              </a:rPr>
+              <a:t>requestWindowFeature(Window.</a:t>
+            </a:r>
+            <a:r>
+              <a:rPr kumimoji="0" lang="zh-CN" altLang="zh-CN" sz="900" b="1" i="1" u="none" strike="noStrike" cap="none" normalizeH="0" baseline="0" dirty="0" smtClean="0">
+                <a:ln>
+                  <a:noFill/>
+                </a:ln>
+                <a:solidFill>
+                  <a:srgbClr val="660E7A"/>
+                </a:solidFill>
+                <a:effectLst/>
+                <a:latin typeface="宋体" panose="02010600030101010101" pitchFamily="2" charset="-122"/>
+                <a:ea typeface="宋体" panose="02010600030101010101" pitchFamily="2" charset="-122"/>
+              </a:rPr>
+              <a:t>FEATURE_NO_TITLE</a:t>
+            </a:r>
+            <a:r>
+              <a:rPr kumimoji="0" lang="zh-CN" altLang="zh-CN" sz="900" b="0" i="0" u="none" strike="noStrike" cap="none" normalizeH="0" baseline="0" dirty="0" smtClean="0">
+                <a:ln>
+                  <a:noFill/>
+                </a:ln>
+                <a:solidFill>
+                  <a:srgbClr val="000000"/>
+                </a:solidFill>
+                <a:effectLst/>
+                <a:latin typeface="宋体" panose="02010600030101010101" pitchFamily="2" charset="-122"/>
+                <a:ea typeface="宋体" panose="02010600030101010101" pitchFamily="2" charset="-122"/>
+              </a:rPr>
+              <a:t>);</a:t>
+            </a:r>
+            <a:r>
+              <a:rPr kumimoji="0" lang="zh-CN" altLang="zh-CN" sz="900" b="0" i="1" u="none" strike="noStrike" cap="none" normalizeH="0" baseline="0" dirty="0" smtClean="0">
+                <a:ln>
+                  <a:noFill/>
+                </a:ln>
+                <a:solidFill>
+                  <a:srgbClr val="808080"/>
+                </a:solidFill>
+                <a:effectLst/>
+                <a:latin typeface="宋体" panose="02010600030101010101" pitchFamily="2" charset="-122"/>
+                <a:ea typeface="宋体" panose="02010600030101010101" pitchFamily="2" charset="-122"/>
+              </a:rPr>
+              <a:t>//设置没有标题</a:t>
+            </a:r>
+            <a:endParaRPr kumimoji="0" lang="zh-CN" altLang="zh-CN" sz="1800" b="0" i="0" u="none" strike="noStrike" cap="none" normalizeH="0" baseline="0" dirty="0" smtClean="0">
+              <a:ln>
+                <a:noFill/>
+              </a:ln>
+              <a:solidFill>
+                <a:schemeClr val="tx1"/>
+              </a:solidFill>
+              <a:effectLst/>
+              <a:latin typeface="Arial" panose="020B0604020202020204" pitchFamily="34" charset="0"/>
+            </a:endParaRPr>
+          </a:p>
+        </p:txBody>
+      </p:sp>
+      <p:sp>
+        <p:nvSpPr>
+          <p:cNvPr id="7" name="Rectangle 2"/>
+          <p:cNvSpPr>
+            <a:spLocks noChangeArrowheads="1"/>
+          </p:cNvSpPr>
+          <p:nvPr/>
+        </p:nvSpPr>
+        <p:spPr bwMode="auto">
+          <a:xfrm>
+            <a:off x="6719034" y="4595574"/>
+            <a:ext cx="3638550" cy="369332"/>
+          </a:xfrm>
+          <a:prstGeom prst="rect">
+            <a:avLst/>
+          </a:prstGeom>
+          <a:solidFill>
+            <a:srgbClr val="FFFFFF"/>
+          </a:solidFill>
+          <a:ln>
+            <a:noFill/>
+          </a:ln>
+          <a:effectLst/>
+          <a:extLst>
+            <a:ext uri="{91240B29-F687-4F45-9708-019B960494DF}">
+              <a14:hiddenLine xmlns:a14="http://schemas.microsoft.com/office/drawing/2010/main" w="9525">
+                <a:solidFill>
+                  <a:schemeClr val="tx1"/>
+                </a:solidFill>
+                <a:miter lim="800000"/>
+                <a:headEnd/>
+                <a:tailEnd/>
+              </a14:hiddenLine>
+            </a:ext>
+            <a:ext uri="{AF507438-7753-43E0-B8FC-AC1667EBCBE1}">
+              <a14:hiddenEffects xmlns:a14="http://schemas.microsoft.com/office/drawing/2010/main">
+                <a:effectLst>
+                  <a:outerShdw dist="35921" dir="2700000" algn="ctr" rotWithShape="0">
+                    <a:schemeClr val="bg2"/>
+                  </a:outerShdw>
+                </a:effectLst>
+              </a14:hiddenEffects>
+            </a:ext>
+          </a:extLst>
+        </p:spPr>
+        <p:txBody>
+          <a:bodyPr vert="horz" wrap="square" lIns="91440" tIns="45720" rIns="91440" bIns="45720" numCol="1" anchor="ctr" anchorCtr="0" compatLnSpc="1">
+            <a:prstTxWarp prst="textNoShape">
+              <a:avLst/>
+            </a:prstTxWarp>
+            <a:spAutoFit/>
+          </a:bodyPr>
+          <a:lstStyle/>
+          <a:p>
+            <a:pPr marL="0" marR="0" lvl="0" indent="0" algn="l" defTabSz="914400" rtl="0" eaLnBrk="0" fontAlgn="base" latinLnBrk="0" hangingPunct="0">
+              <a:lnSpc>
+                <a:spcPct val="100000"/>
+              </a:lnSpc>
+              <a:spcBef>
+                <a:spcPct val="0"/>
+              </a:spcBef>
+              <a:spcAft>
+                <a:spcPct val="0"/>
+              </a:spcAft>
+              <a:buClrTx/>
+              <a:buSzTx/>
+              <a:buFontTx/>
+              <a:buNone/>
+              <a:tabLst/>
+            </a:pPr>
+            <a:r>
+              <a:rPr kumimoji="0" lang="zh-CN" altLang="zh-CN" sz="900" b="0" i="0" u="none" strike="noStrike" cap="none" normalizeH="0" baseline="0" dirty="0" smtClean="0">
+                <a:ln>
+                  <a:noFill/>
+                </a:ln>
+                <a:solidFill>
+                  <a:srgbClr val="000000"/>
+                </a:solidFill>
+                <a:effectLst/>
+                <a:latin typeface="宋体" panose="02010600030101010101" pitchFamily="2" charset="-122"/>
+                <a:ea typeface="宋体" panose="02010600030101010101" pitchFamily="2" charset="-122"/>
+              </a:rPr>
+              <a:t>getWindow().addFlags(WindowManager.LayoutParams.</a:t>
+            </a:r>
+            <a:r>
+              <a:rPr kumimoji="0" lang="zh-CN" altLang="zh-CN" sz="900" b="1" i="1" u="none" strike="noStrike" cap="none" normalizeH="0" baseline="0" dirty="0" smtClean="0">
+                <a:ln>
+                  <a:noFill/>
+                </a:ln>
+                <a:solidFill>
+                  <a:srgbClr val="660E7A"/>
+                </a:solidFill>
+                <a:effectLst/>
+                <a:latin typeface="宋体" panose="02010600030101010101" pitchFamily="2" charset="-122"/>
+                <a:ea typeface="宋体" panose="02010600030101010101" pitchFamily="2" charset="-122"/>
+              </a:rPr>
+              <a:t>FLAG_TRANSLUCENT_NAVIGATION </a:t>
+            </a:r>
+            <a:r>
+              <a:rPr kumimoji="0" lang="zh-CN" altLang="zh-CN" sz="900" b="0" i="0" u="none" strike="noStrike" cap="none" normalizeH="0" baseline="0" dirty="0" smtClean="0">
+                <a:ln>
+                  <a:noFill/>
+                </a:ln>
+                <a:solidFill>
+                  <a:srgbClr val="000000"/>
+                </a:solidFill>
+                <a:effectLst/>
+                <a:latin typeface="宋体" panose="02010600030101010101" pitchFamily="2" charset="-122"/>
+                <a:ea typeface="宋体" panose="02010600030101010101" pitchFamily="2" charset="-122"/>
+              </a:rPr>
+              <a:t>);</a:t>
+            </a:r>
+            <a:r>
+              <a:rPr kumimoji="0" lang="en-US" altLang="zh-CN" sz="900" b="0" i="0" u="none" strike="noStrike" cap="none" normalizeH="0" baseline="0" dirty="0" smtClean="0">
+                <a:ln>
+                  <a:noFill/>
+                </a:ln>
+                <a:solidFill>
+                  <a:srgbClr val="000000"/>
+                </a:solidFill>
+                <a:effectLst/>
+                <a:latin typeface="宋体" panose="02010600030101010101" pitchFamily="2" charset="-122"/>
+                <a:ea typeface="宋体" panose="02010600030101010101" pitchFamily="2" charset="-122"/>
+              </a:rPr>
+              <a:t>//d</a:t>
+            </a:r>
+            <a:endParaRPr kumimoji="0" lang="zh-CN" altLang="zh-CN" sz="1800" b="0" i="0" u="none" strike="noStrike" cap="none" normalizeH="0" baseline="0" dirty="0" smtClean="0">
+              <a:ln>
+                <a:noFill/>
+              </a:ln>
+              <a:solidFill>
+                <a:schemeClr val="tx1"/>
+              </a:solidFill>
+              <a:effectLst/>
+              <a:latin typeface="Arial" panose="020B0604020202020204" pitchFamily="34" charset="0"/>
+            </a:endParaRPr>
           </a:p>
         </p:txBody>
       </p:sp>
@@ -3198,7 +3671,6 @@
               <a:rPr lang="zh-CN" altLang="en-US" dirty="0"/>
               <a:t>广告画面</a:t>
             </a:r>
-            <a:endParaRPr lang="zh-CN" altLang="en-US" dirty="0"/>
           </a:p>
         </p:txBody>
       </p:sp>
@@ -3558,7 +4030,6 @@
               <a:rPr lang="zh-CN" altLang="en-US" dirty="0"/>
               <a:t>主界面</a:t>
             </a:r>
-            <a:endParaRPr lang="zh-CN" altLang="en-US" dirty="0"/>
           </a:p>
         </p:txBody>
       </p:sp>
@@ -3607,36 +4078,6 @@
       </p:sp>
       <p:sp>
         <p:nvSpPr>
-          <p:cNvPr id="12" name="文本框 11"/>
-          <p:cNvSpPr txBox="1"/>
-          <p:nvPr/>
-        </p:nvSpPr>
-        <p:spPr>
-          <a:xfrm>
-            <a:off x="343914" y="5472774"/>
-            <a:ext cx="3642852" cy="369332"/>
-          </a:xfrm>
-          <a:prstGeom prst="rect">
-            <a:avLst/>
-          </a:prstGeom>
-          <a:noFill/>
-        </p:spPr>
-        <p:txBody>
-          <a:bodyPr wrap="square" rtlCol="0">
-            <a:spAutoFit/>
-          </a:bodyPr>
-          <a:lstStyle/>
-          <a:p>
-            <a:r>
-              <a:rPr lang="zh-CN" altLang="en-US" dirty="0" smtClean="0"/>
-              <a:t>以漂亮图片代替文字</a:t>
-            </a:r>
-            <a:endParaRPr lang="zh-CN" altLang="en-US" dirty="0"/>
-          </a:p>
-        </p:txBody>
-      </p:sp>
-      <p:sp>
-        <p:nvSpPr>
           <p:cNvPr id="4" name="圆角矩形 3"/>
           <p:cNvSpPr/>
           <p:nvPr/>
@@ -3737,11 +4178,6 @@
               </a:rPr>
               <a:t>新闻</a:t>
             </a:r>
-            <a:endParaRPr lang="zh-CN" altLang="en-US" sz="1200" b="1" dirty="0">
-              <a:solidFill>
-                <a:schemeClr val="tx1"/>
-              </a:solidFill>
-            </a:endParaRPr>
           </a:p>
         </p:txBody>
       </p:sp>
@@ -3792,11 +4228,6 @@
               </a:rPr>
               <a:t>商城</a:t>
             </a:r>
-            <a:endParaRPr lang="zh-CN" altLang="en-US" sz="1200" b="1" dirty="0">
-              <a:solidFill>
-                <a:schemeClr val="tx1"/>
-              </a:solidFill>
-            </a:endParaRPr>
           </a:p>
         </p:txBody>
       </p:sp>
@@ -3913,39 +4344,6 @@
           </a:p>
         </p:txBody>
       </p:sp>
-      <p:cxnSp>
-        <p:nvCxnSpPr>
-          <p:cNvPr id="6" name="直接箭头连接符 5"/>
-          <p:cNvCxnSpPr/>
-          <p:nvPr/>
-        </p:nvCxnSpPr>
-        <p:spPr>
-          <a:xfrm>
-            <a:off x="2750577" y="5657440"/>
-            <a:ext cx="258096" cy="0"/>
-          </a:xfrm>
-          <a:prstGeom prst="straightConnector1">
-            <a:avLst/>
-          </a:prstGeom>
-          <a:ln>
-            <a:tailEnd type="triangle"/>
-          </a:ln>
-        </p:spPr>
-        <p:style>
-          <a:lnRef idx="1">
-            <a:schemeClr val="accent1"/>
-          </a:lnRef>
-          <a:fillRef idx="0">
-            <a:schemeClr val="accent1"/>
-          </a:fillRef>
-          <a:effectRef idx="0">
-            <a:schemeClr val="accent1"/>
-          </a:effectRef>
-          <a:fontRef idx="minor">
-            <a:schemeClr val="tx1"/>
-          </a:fontRef>
-        </p:style>
-      </p:cxnSp>
       <p:sp>
         <p:nvSpPr>
           <p:cNvPr id="17" name="文本框 16"/>
@@ -4018,36 +4416,6 @@
             <a:r>
               <a:rPr lang="zh-CN" altLang="en-US" dirty="0" smtClean="0"/>
               <a:t>主页面</a:t>
-            </a:r>
-            <a:endParaRPr lang="zh-CN" altLang="en-US" dirty="0"/>
-          </a:p>
-        </p:txBody>
-      </p:sp>
-      <p:sp>
-        <p:nvSpPr>
-          <p:cNvPr id="19" name="文本框 18"/>
-          <p:cNvSpPr txBox="1"/>
-          <p:nvPr/>
-        </p:nvSpPr>
-        <p:spPr>
-          <a:xfrm>
-            <a:off x="196430" y="1080690"/>
-            <a:ext cx="3642852" cy="369332"/>
-          </a:xfrm>
-          <a:prstGeom prst="rect">
-            <a:avLst/>
-          </a:prstGeom>
-          <a:noFill/>
-        </p:spPr>
-        <p:txBody>
-          <a:bodyPr wrap="square" rtlCol="0">
-            <a:spAutoFit/>
-          </a:bodyPr>
-          <a:lstStyle/>
-          <a:p>
-            <a:r>
-              <a:rPr lang="zh-CN" altLang="en-US" dirty="0" smtClean="0"/>
-              <a:t>以漂亮图片代替文字</a:t>
             </a:r>
             <a:endParaRPr lang="zh-CN" altLang="en-US" dirty="0"/>
           </a:p>

</xml_diff>